<commit_message>
fix spelling error in slide
</commit_message>
<xml_diff>
--- a/community-labs/Community Lab - Intro to Composable (Common).pptx
+++ b/community-labs/Community Lab - Intro to Composable (Common).pptx
@@ -25620,7 +25620,7 @@
             </a:pPr>
             <a:r>
               <a:rPr lang="en"/>
-              <a:t>@staticmethod provides means to tear off buildable micro components that afe configured by metaparameters (factory design pattern).</a:t>
+              <a:t>@staticmethod provides means to tear off buildable micro components that are configured by metaparameters (factory design pattern).</a:t>
             </a:r>
             <a:endParaRPr/>
           </a:p>
@@ -25675,6 +25675,285 @@
 </file>
 
 <file path=ppt/theme/theme1.xml><?xml version="1.0" encoding="utf-8"?>
+<a:theme xmlns:a="http://schemas.openxmlformats.org/drawingml/2006/main" xmlns:r="http://schemas.openxmlformats.org/officeDocument/2006/relationships" name="Simple Light">
+  <a:themeElements>
+    <a:clrScheme name="Simple Light">
+      <a:dk1>
+        <a:srgbClr val="000000"/>
+      </a:dk1>
+      <a:lt1>
+        <a:srgbClr val="FFFFFF"/>
+      </a:lt1>
+      <a:dk2>
+        <a:srgbClr val="595959"/>
+      </a:dk2>
+      <a:lt2>
+        <a:srgbClr val="EEEEEE"/>
+      </a:lt2>
+      <a:accent1>
+        <a:srgbClr val="FFAB40"/>
+      </a:accent1>
+      <a:accent2>
+        <a:srgbClr val="212121"/>
+      </a:accent2>
+      <a:accent3>
+        <a:srgbClr val="78909C"/>
+      </a:accent3>
+      <a:accent4>
+        <a:srgbClr val="FFAB40"/>
+      </a:accent4>
+      <a:accent5>
+        <a:srgbClr val="0097A7"/>
+      </a:accent5>
+      <a:accent6>
+        <a:srgbClr val="EEFF41"/>
+      </a:accent6>
+      <a:hlink>
+        <a:srgbClr val="0097A7"/>
+      </a:hlink>
+      <a:folHlink>
+        <a:srgbClr val="0097A7"/>
+      </a:folHlink>
+    </a:clrScheme>
+    <a:fontScheme name="Office">
+      <a:majorFont>
+        <a:latin typeface="Arial"/>
+        <a:ea typeface=""/>
+        <a:cs typeface=""/>
+        <a:font script="Jpan" typeface="ＭＳ Ｐゴシック"/>
+        <a:font script="Hang" typeface="맑은 고딕"/>
+        <a:font script="Hans" typeface="宋体"/>
+        <a:font script="Hant" typeface="新細明體"/>
+        <a:font script="Arab" typeface="Times New Roman"/>
+        <a:font script="Hebr" typeface="Times New Roman"/>
+        <a:font script="Thai" typeface="Angsana New"/>
+        <a:font script="Ethi" typeface="Nyala"/>
+        <a:font script="Beng" typeface="Vrinda"/>
+        <a:font script="Gujr" typeface="Shruti"/>
+        <a:font script="Khmr" typeface="MoolBoran"/>
+        <a:font script="Knda" typeface="Tunga"/>
+        <a:font script="Guru" typeface="Raavi"/>
+        <a:font script="Cans" typeface="Euphemia"/>
+        <a:font script="Cher" typeface="Plantagenet Cherokee"/>
+        <a:font script="Yiii" typeface="Microsoft Yi Baiti"/>
+        <a:font script="Tibt" typeface="Microsoft Himalaya"/>
+        <a:font script="Thaa" typeface="MV Boli"/>
+        <a:font script="Deva" typeface="Mangal"/>
+        <a:font script="Telu" typeface="Gautami"/>
+        <a:font script="Taml" typeface="Latha"/>
+        <a:font script="Syrc" typeface="Estrangelo Edessa"/>
+        <a:font script="Orya" typeface="Kalinga"/>
+        <a:font script="Mlym" typeface="Kartika"/>
+        <a:font script="Laoo" typeface="DokChampa"/>
+        <a:font script="Sinh" typeface="Iskoola Pota"/>
+        <a:font script="Mong" typeface="Mongolian Baiti"/>
+        <a:font script="Viet" typeface="Times New Roman"/>
+        <a:font script="Uigh" typeface="Microsoft Uighur"/>
+        <a:font script="Geor" typeface="Sylfaen"/>
+      </a:majorFont>
+      <a:minorFont>
+        <a:latin typeface="Arial"/>
+        <a:ea typeface=""/>
+        <a:cs typeface=""/>
+        <a:font script="Jpan" typeface="ＭＳ Ｐゴシック"/>
+        <a:font script="Hang" typeface="맑은 고딕"/>
+        <a:font script="Hans" typeface="宋体"/>
+        <a:font script="Hant" typeface="新細明體"/>
+        <a:font script="Arab" typeface="Arial"/>
+        <a:font script="Hebr" typeface="Arial"/>
+        <a:font script="Thai" typeface="Cordia New"/>
+        <a:font script="Ethi" typeface="Nyala"/>
+        <a:font script="Beng" typeface="Vrinda"/>
+        <a:font script="Gujr" typeface="Shruti"/>
+        <a:font script="Khmr" typeface="DaunPenh"/>
+        <a:font script="Knda" typeface="Tunga"/>
+        <a:font script="Guru" typeface="Raavi"/>
+        <a:font script="Cans" typeface="Euphemia"/>
+        <a:font script="Cher" typeface="Plantagenet Cherokee"/>
+        <a:font script="Yiii" typeface="Microsoft Yi Baiti"/>
+        <a:font script="Tibt" typeface="Microsoft Himalaya"/>
+        <a:font script="Thaa" typeface="MV Boli"/>
+        <a:font script="Deva" typeface="Mangal"/>
+        <a:font script="Telu" typeface="Gautami"/>
+        <a:font script="Taml" typeface="Latha"/>
+        <a:font script="Syrc" typeface="Estrangelo Edessa"/>
+        <a:font script="Orya" typeface="Kalinga"/>
+        <a:font script="Mlym" typeface="Kartika"/>
+        <a:font script="Laoo" typeface="DokChampa"/>
+        <a:font script="Sinh" typeface="Iskoola Pota"/>
+        <a:font script="Mong" typeface="Mongolian Baiti"/>
+        <a:font script="Viet" typeface="Arial"/>
+        <a:font script="Uigh" typeface="Microsoft Uighur"/>
+        <a:font script="Geor" typeface="Sylfaen"/>
+      </a:minorFont>
+    </a:fontScheme>
+    <a:fmtScheme name="Office">
+      <a:fillStyleLst>
+        <a:solidFill>
+          <a:schemeClr val="phClr"/>
+        </a:solidFill>
+        <a:gradFill rotWithShape="1">
+          <a:gsLst>
+            <a:gs pos="0">
+              <a:schemeClr val="phClr">
+                <a:tint val="50000"/>
+                <a:satMod val="300000"/>
+              </a:schemeClr>
+            </a:gs>
+            <a:gs pos="35000">
+              <a:schemeClr val="phClr">
+                <a:tint val="37000"/>
+                <a:satMod val="300000"/>
+              </a:schemeClr>
+            </a:gs>
+            <a:gs pos="100000">
+              <a:schemeClr val="phClr">
+                <a:tint val="15000"/>
+                <a:satMod val="350000"/>
+              </a:schemeClr>
+            </a:gs>
+          </a:gsLst>
+          <a:lin ang="16200000" scaled="1"/>
+        </a:gradFill>
+        <a:gradFill rotWithShape="1">
+          <a:gsLst>
+            <a:gs pos="0">
+              <a:schemeClr val="phClr">
+                <a:tint val="100000"/>
+                <a:shade val="100000"/>
+                <a:satMod val="130000"/>
+              </a:schemeClr>
+            </a:gs>
+            <a:gs pos="100000">
+              <a:schemeClr val="phClr">
+                <a:tint val="50000"/>
+                <a:shade val="100000"/>
+                <a:satMod val="350000"/>
+              </a:schemeClr>
+            </a:gs>
+          </a:gsLst>
+          <a:lin ang="16200000" scaled="0"/>
+        </a:gradFill>
+      </a:fillStyleLst>
+      <a:lnStyleLst>
+        <a:ln w="9525" cap="flat" cmpd="sng" algn="ctr">
+          <a:solidFill>
+            <a:schemeClr val="phClr">
+              <a:shade val="95000"/>
+              <a:satMod val="105000"/>
+            </a:schemeClr>
+          </a:solidFill>
+          <a:prstDash val="solid"/>
+        </a:ln>
+        <a:ln w="25400" cap="flat" cmpd="sng" algn="ctr">
+          <a:solidFill>
+            <a:schemeClr val="phClr"/>
+          </a:solidFill>
+          <a:prstDash val="solid"/>
+        </a:ln>
+        <a:ln w="38100" cap="flat" cmpd="sng" algn="ctr">
+          <a:solidFill>
+            <a:schemeClr val="phClr"/>
+          </a:solidFill>
+          <a:prstDash val="solid"/>
+        </a:ln>
+      </a:lnStyleLst>
+      <a:effectStyleLst>
+        <a:effectStyle>
+          <a:effectLst>
+            <a:outerShdw blurRad="40000" dist="20000" dir="5400000" rotWithShape="0">
+              <a:srgbClr val="000000">
+                <a:alpha val="38000"/>
+              </a:srgbClr>
+            </a:outerShdw>
+          </a:effectLst>
+        </a:effectStyle>
+        <a:effectStyle>
+          <a:effectLst>
+            <a:outerShdw blurRad="40000" dist="23000" dir="5400000" rotWithShape="0">
+              <a:srgbClr val="000000">
+                <a:alpha val="35000"/>
+              </a:srgbClr>
+            </a:outerShdw>
+          </a:effectLst>
+        </a:effectStyle>
+        <a:effectStyle>
+          <a:effectLst>
+            <a:outerShdw blurRad="40000" dist="23000" dir="5400000" rotWithShape="0">
+              <a:srgbClr val="000000">
+                <a:alpha val="35000"/>
+              </a:srgbClr>
+            </a:outerShdw>
+          </a:effectLst>
+          <a:scene3d>
+            <a:camera prst="orthographicFront">
+              <a:rot lat="0" lon="0" rev="0"/>
+            </a:camera>
+            <a:lightRig rig="threePt" dir="t">
+              <a:rot lat="0" lon="0" rev="1200000"/>
+            </a:lightRig>
+          </a:scene3d>
+          <a:sp3d>
+            <a:bevelT w="63500" h="25400"/>
+          </a:sp3d>
+        </a:effectStyle>
+      </a:effectStyleLst>
+      <a:bgFillStyleLst>
+        <a:solidFill>
+          <a:schemeClr val="phClr"/>
+        </a:solidFill>
+        <a:gradFill rotWithShape="1">
+          <a:gsLst>
+            <a:gs pos="0">
+              <a:schemeClr val="phClr">
+                <a:tint val="40000"/>
+                <a:satMod val="350000"/>
+              </a:schemeClr>
+            </a:gs>
+            <a:gs pos="40000">
+              <a:schemeClr val="phClr">
+                <a:tint val="45000"/>
+                <a:shade val="99000"/>
+                <a:satMod val="350000"/>
+              </a:schemeClr>
+            </a:gs>
+            <a:gs pos="100000">
+              <a:schemeClr val="phClr">
+                <a:shade val="20000"/>
+                <a:satMod val="255000"/>
+              </a:schemeClr>
+            </a:gs>
+          </a:gsLst>
+          <a:path path="circle">
+            <a:fillToRect l="50000" t="-80000" r="50000" b="180000"/>
+          </a:path>
+        </a:gradFill>
+        <a:gradFill rotWithShape="1">
+          <a:gsLst>
+            <a:gs pos="0">
+              <a:schemeClr val="phClr">
+                <a:tint val="80000"/>
+                <a:satMod val="300000"/>
+              </a:schemeClr>
+            </a:gs>
+            <a:gs pos="100000">
+              <a:schemeClr val="phClr">
+                <a:shade val="30000"/>
+                <a:satMod val="200000"/>
+              </a:schemeClr>
+            </a:gs>
+          </a:gsLst>
+          <a:path path="circle">
+            <a:fillToRect l="50000" t="50000" r="50000" b="50000"/>
+          </a:path>
+        </a:gradFill>
+      </a:bgFillStyleLst>
+    </a:fmtScheme>
+  </a:themeElements>
+</a:theme>
+</file>
+
+<file path=ppt/theme/theme2.xml><?xml version="1.0" encoding="utf-8"?>
 <a:theme xmlns:a="http://schemas.openxmlformats.org/drawingml/2006/main" xmlns:r="http://schemas.openxmlformats.org/officeDocument/2006/relationships">
   <a:themeElements>
     <a:clrScheme name="Default">
@@ -25951,283 +26230,4 @@
     </a:fmtScheme>
   </a:themeElements>
 </a:theme>
-</file>
-
-<file path=ppt/theme/theme2.xml><?xml version="1.0" encoding="utf-8"?>
-<a:theme xmlns:a="http://schemas.openxmlformats.org/drawingml/2006/main" xmlns:r="http://schemas.openxmlformats.org/officeDocument/2006/relationships" name="Simple Light">
-  <a:themeElements>
-    <a:clrScheme name="Simple Light">
-      <a:dk1>
-        <a:srgbClr val="000000"/>
-      </a:dk1>
-      <a:lt1>
-        <a:srgbClr val="FFFFFF"/>
-      </a:lt1>
-      <a:dk2>
-        <a:srgbClr val="595959"/>
-      </a:dk2>
-      <a:lt2>
-        <a:srgbClr val="EEEEEE"/>
-      </a:lt2>
-      <a:accent1>
-        <a:srgbClr val="FFAB40"/>
-      </a:accent1>
-      <a:accent2>
-        <a:srgbClr val="212121"/>
-      </a:accent2>
-      <a:accent3>
-        <a:srgbClr val="78909C"/>
-      </a:accent3>
-      <a:accent4>
-        <a:srgbClr val="FFAB40"/>
-      </a:accent4>
-      <a:accent5>
-        <a:srgbClr val="0097A7"/>
-      </a:accent5>
-      <a:accent6>
-        <a:srgbClr val="EEFF41"/>
-      </a:accent6>
-      <a:hlink>
-        <a:srgbClr val="0097A7"/>
-      </a:hlink>
-      <a:folHlink>
-        <a:srgbClr val="0097A7"/>
-      </a:folHlink>
-    </a:clrScheme>
-    <a:fontScheme name="Office">
-      <a:majorFont>
-        <a:latin typeface="Arial"/>
-        <a:ea typeface=""/>
-        <a:cs typeface=""/>
-        <a:font script="Jpan" typeface="ＭＳ Ｐゴシック"/>
-        <a:font script="Hang" typeface="맑은 고딕"/>
-        <a:font script="Hans" typeface="宋体"/>
-        <a:font script="Hant" typeface="新細明體"/>
-        <a:font script="Arab" typeface="Times New Roman"/>
-        <a:font script="Hebr" typeface="Times New Roman"/>
-        <a:font script="Thai" typeface="Angsana New"/>
-        <a:font script="Ethi" typeface="Nyala"/>
-        <a:font script="Beng" typeface="Vrinda"/>
-        <a:font script="Gujr" typeface="Shruti"/>
-        <a:font script="Khmr" typeface="MoolBoran"/>
-        <a:font script="Knda" typeface="Tunga"/>
-        <a:font script="Guru" typeface="Raavi"/>
-        <a:font script="Cans" typeface="Euphemia"/>
-        <a:font script="Cher" typeface="Plantagenet Cherokee"/>
-        <a:font script="Yiii" typeface="Microsoft Yi Baiti"/>
-        <a:font script="Tibt" typeface="Microsoft Himalaya"/>
-        <a:font script="Thaa" typeface="MV Boli"/>
-        <a:font script="Deva" typeface="Mangal"/>
-        <a:font script="Telu" typeface="Gautami"/>
-        <a:font script="Taml" typeface="Latha"/>
-        <a:font script="Syrc" typeface="Estrangelo Edessa"/>
-        <a:font script="Orya" typeface="Kalinga"/>
-        <a:font script="Mlym" typeface="Kartika"/>
-        <a:font script="Laoo" typeface="DokChampa"/>
-        <a:font script="Sinh" typeface="Iskoola Pota"/>
-        <a:font script="Mong" typeface="Mongolian Baiti"/>
-        <a:font script="Viet" typeface="Times New Roman"/>
-        <a:font script="Uigh" typeface="Microsoft Uighur"/>
-        <a:font script="Geor" typeface="Sylfaen"/>
-      </a:majorFont>
-      <a:minorFont>
-        <a:latin typeface="Arial"/>
-        <a:ea typeface=""/>
-        <a:cs typeface=""/>
-        <a:font script="Jpan" typeface="ＭＳ Ｐゴシック"/>
-        <a:font script="Hang" typeface="맑은 고딕"/>
-        <a:font script="Hans" typeface="宋体"/>
-        <a:font script="Hant" typeface="新細明體"/>
-        <a:font script="Arab" typeface="Arial"/>
-        <a:font script="Hebr" typeface="Arial"/>
-        <a:font script="Thai" typeface="Cordia New"/>
-        <a:font script="Ethi" typeface="Nyala"/>
-        <a:font script="Beng" typeface="Vrinda"/>
-        <a:font script="Gujr" typeface="Shruti"/>
-        <a:font script="Khmr" typeface="DaunPenh"/>
-        <a:font script="Knda" typeface="Tunga"/>
-        <a:font script="Guru" typeface="Raavi"/>
-        <a:font script="Cans" typeface="Euphemia"/>
-        <a:font script="Cher" typeface="Plantagenet Cherokee"/>
-        <a:font script="Yiii" typeface="Microsoft Yi Baiti"/>
-        <a:font script="Tibt" typeface="Microsoft Himalaya"/>
-        <a:font script="Thaa" typeface="MV Boli"/>
-        <a:font script="Deva" typeface="Mangal"/>
-        <a:font script="Telu" typeface="Gautami"/>
-        <a:font script="Taml" typeface="Latha"/>
-        <a:font script="Syrc" typeface="Estrangelo Edessa"/>
-        <a:font script="Orya" typeface="Kalinga"/>
-        <a:font script="Mlym" typeface="Kartika"/>
-        <a:font script="Laoo" typeface="DokChampa"/>
-        <a:font script="Sinh" typeface="Iskoola Pota"/>
-        <a:font script="Mong" typeface="Mongolian Baiti"/>
-        <a:font script="Viet" typeface="Arial"/>
-        <a:font script="Uigh" typeface="Microsoft Uighur"/>
-        <a:font script="Geor" typeface="Sylfaen"/>
-      </a:minorFont>
-    </a:fontScheme>
-    <a:fmtScheme name="Office">
-      <a:fillStyleLst>
-        <a:solidFill>
-          <a:schemeClr val="phClr"/>
-        </a:solidFill>
-        <a:gradFill rotWithShape="1">
-          <a:gsLst>
-            <a:gs pos="0">
-              <a:schemeClr val="phClr">
-                <a:tint val="50000"/>
-                <a:satMod val="300000"/>
-              </a:schemeClr>
-            </a:gs>
-            <a:gs pos="35000">
-              <a:schemeClr val="phClr">
-                <a:tint val="37000"/>
-                <a:satMod val="300000"/>
-              </a:schemeClr>
-            </a:gs>
-            <a:gs pos="100000">
-              <a:schemeClr val="phClr">
-                <a:tint val="15000"/>
-                <a:satMod val="350000"/>
-              </a:schemeClr>
-            </a:gs>
-          </a:gsLst>
-          <a:lin ang="16200000" scaled="1"/>
-        </a:gradFill>
-        <a:gradFill rotWithShape="1">
-          <a:gsLst>
-            <a:gs pos="0">
-              <a:schemeClr val="phClr">
-                <a:tint val="100000"/>
-                <a:shade val="100000"/>
-                <a:satMod val="130000"/>
-              </a:schemeClr>
-            </a:gs>
-            <a:gs pos="100000">
-              <a:schemeClr val="phClr">
-                <a:tint val="50000"/>
-                <a:shade val="100000"/>
-                <a:satMod val="350000"/>
-              </a:schemeClr>
-            </a:gs>
-          </a:gsLst>
-          <a:lin ang="16200000" scaled="0"/>
-        </a:gradFill>
-      </a:fillStyleLst>
-      <a:lnStyleLst>
-        <a:ln w="9525" cap="flat" cmpd="sng" algn="ctr">
-          <a:solidFill>
-            <a:schemeClr val="phClr">
-              <a:shade val="95000"/>
-              <a:satMod val="105000"/>
-            </a:schemeClr>
-          </a:solidFill>
-          <a:prstDash val="solid"/>
-        </a:ln>
-        <a:ln w="25400" cap="flat" cmpd="sng" algn="ctr">
-          <a:solidFill>
-            <a:schemeClr val="phClr"/>
-          </a:solidFill>
-          <a:prstDash val="solid"/>
-        </a:ln>
-        <a:ln w="38100" cap="flat" cmpd="sng" algn="ctr">
-          <a:solidFill>
-            <a:schemeClr val="phClr"/>
-          </a:solidFill>
-          <a:prstDash val="solid"/>
-        </a:ln>
-      </a:lnStyleLst>
-      <a:effectStyleLst>
-        <a:effectStyle>
-          <a:effectLst>
-            <a:outerShdw blurRad="40000" dist="20000" dir="5400000" rotWithShape="0">
-              <a:srgbClr val="000000">
-                <a:alpha val="38000"/>
-              </a:srgbClr>
-            </a:outerShdw>
-          </a:effectLst>
-        </a:effectStyle>
-        <a:effectStyle>
-          <a:effectLst>
-            <a:outerShdw blurRad="40000" dist="23000" dir="5400000" rotWithShape="0">
-              <a:srgbClr val="000000">
-                <a:alpha val="35000"/>
-              </a:srgbClr>
-            </a:outerShdw>
-          </a:effectLst>
-        </a:effectStyle>
-        <a:effectStyle>
-          <a:effectLst>
-            <a:outerShdw blurRad="40000" dist="23000" dir="5400000" rotWithShape="0">
-              <a:srgbClr val="000000">
-                <a:alpha val="35000"/>
-              </a:srgbClr>
-            </a:outerShdw>
-          </a:effectLst>
-          <a:scene3d>
-            <a:camera prst="orthographicFront">
-              <a:rot lat="0" lon="0" rev="0"/>
-            </a:camera>
-            <a:lightRig rig="threePt" dir="t">
-              <a:rot lat="0" lon="0" rev="1200000"/>
-            </a:lightRig>
-          </a:scene3d>
-          <a:sp3d>
-            <a:bevelT w="63500" h="25400"/>
-          </a:sp3d>
-        </a:effectStyle>
-      </a:effectStyleLst>
-      <a:bgFillStyleLst>
-        <a:solidFill>
-          <a:schemeClr val="phClr"/>
-        </a:solidFill>
-        <a:gradFill rotWithShape="1">
-          <a:gsLst>
-            <a:gs pos="0">
-              <a:schemeClr val="phClr">
-                <a:tint val="40000"/>
-                <a:satMod val="350000"/>
-              </a:schemeClr>
-            </a:gs>
-            <a:gs pos="40000">
-              <a:schemeClr val="phClr">
-                <a:tint val="45000"/>
-                <a:shade val="99000"/>
-                <a:satMod val="350000"/>
-              </a:schemeClr>
-            </a:gs>
-            <a:gs pos="100000">
-              <a:schemeClr val="phClr">
-                <a:shade val="20000"/>
-                <a:satMod val="255000"/>
-              </a:schemeClr>
-            </a:gs>
-          </a:gsLst>
-          <a:path path="circle">
-            <a:fillToRect l="50000" t="-80000" r="50000" b="180000"/>
-          </a:path>
-        </a:gradFill>
-        <a:gradFill rotWithShape="1">
-          <a:gsLst>
-            <a:gs pos="0">
-              <a:schemeClr val="phClr">
-                <a:tint val="80000"/>
-                <a:satMod val="300000"/>
-              </a:schemeClr>
-            </a:gs>
-            <a:gs pos="100000">
-              <a:schemeClr val="phClr">
-                <a:shade val="30000"/>
-                <a:satMod val="200000"/>
-              </a:schemeClr>
-            </a:gs>
-          </a:gsLst>
-          <a:path path="circle">
-            <a:fillToRect l="50000" t="50000" r="50000" b="50000"/>
-          </a:path>
-        </a:gradFill>
-      </a:bgFillStyleLst>
-    </a:fmtScheme>
-  </a:themeElements>
-</a:theme>
 </file>
</xml_diff>

<commit_message>
revised to latest composable
</commit_message>
<xml_diff>
--- a/community-labs/Community Lab - Intro to Composable (Common).pptx
+++ b/community-labs/Community Lab - Intro to Composable (Common).pptx
@@ -10928,6 +10928,74 @@
               <a:spcAft>
                 <a:spcPts val="0"/>
               </a:spcAft>
+              <a:buClr>
+                <a:schemeClr val="dk1"/>
+              </a:buClr>
+              <a:buSzPts val="1100"/>
+              <a:buFont typeface="Arial"/>
+              <a:buNone/>
+            </a:pPr>
+            <a:r>
+              <a:rPr b="1" lang="en">
+                <a:solidFill>
+                  <a:srgbClr val="6D9EEB"/>
+                </a:solidFill>
+              </a:rPr>
+              <a:t>class </a:t>
+            </a:r>
+            <a:r>
+              <a:rPr b="1" lang="en">
+                <a:solidFill>
+                  <a:schemeClr val="lt1"/>
+                </a:solidFill>
+              </a:rPr>
+              <a:t>MyModel():</a:t>
+            </a:r>
+            <a:br>
+              <a:rPr b="1" lang="en">
+                <a:solidFill>
+                  <a:schemeClr val="lt1"/>
+                </a:solidFill>
+              </a:rPr>
+            </a:br>
+            <a:r>
+              <a:rPr b="1" lang="en">
+                <a:solidFill>
+                  <a:schemeClr val="lt1"/>
+                </a:solidFill>
+              </a:rPr>
+              <a:t>        </a:t>
+            </a:r>
+            <a:r>
+              <a:rPr lang="en">
+                <a:solidFill>
+                  <a:srgbClr val="38761D"/>
+                </a:solidFill>
+              </a:rPr>
+              <a:t> </a:t>
+            </a:r>
+            <a:r>
+              <a:rPr lang="en">
+                <a:solidFill>
+                  <a:srgbClr val="93C47D"/>
+                </a:solidFill>
+              </a:rPr>
+              <a:t># ...</a:t>
+            </a:r>
+            <a:endParaRPr>
+              <a:solidFill>
+                <a:srgbClr val="93C47D"/>
+              </a:solidFill>
+            </a:endParaRPr>
+          </a:p>
+          <a:p>
+            <a:pPr indent="0" lvl="0" marL="457200" rtl="0" algn="l">
+              <a:spcBef>
+                <a:spcPts val="0"/>
+              </a:spcBef>
+              <a:spcAft>
+                <a:spcPts val="0"/>
+              </a:spcAft>
               <a:buNone/>
             </a:pPr>
             <a:r>
@@ -10944,7 +11012,7 @@
                   <a:srgbClr val="FFFFFF"/>
                 </a:solidFill>
               </a:rPr>
-              <a:t>group(inputs, strides=(2, 2), **metaparameters):</a:t>
+              <a:t>group(self, inputs, strides=(2, 2), **metaparameters):</a:t>
             </a:r>
             <a:endParaRPr>
               <a:solidFill>
@@ -10953,7 +11021,7 @@
             </a:endParaRPr>
           </a:p>
           <a:p>
-            <a:pPr indent="0" lvl="0" marL="0" rtl="0" algn="l">
+            <a:pPr indent="0" lvl="0" marL="457200" rtl="0" algn="l">
               <a:spcBef>
                 <a:spcPts val="0"/>
               </a:spcBef>
@@ -10972,7 +11040,7 @@
             </a:endParaRPr>
           </a:p>
           <a:p>
-            <a:pPr indent="0" lvl="0" marL="0" rtl="0" algn="l">
+            <a:pPr indent="0" lvl="0" marL="457200" rtl="0" algn="l">
               <a:spcBef>
                 <a:spcPts val="0"/>
               </a:spcBef>
@@ -10996,7 +11064,7 @@
             </a:endParaRPr>
           </a:p>
           <a:p>
-            <a:pPr indent="0" lvl="0" marL="0" rtl="0" algn="l">
+            <a:pPr indent="0" lvl="0" marL="457200" rtl="0" algn="l">
               <a:spcBef>
                 <a:spcPts val="0"/>
               </a:spcBef>
@@ -11020,7 +11088,7 @@
             </a:endParaRPr>
           </a:p>
           <a:p>
-            <a:pPr indent="0" lvl="0" marL="0" rtl="0" algn="l">
+            <a:pPr indent="0" lvl="0" marL="457200" rtl="0" algn="l">
               <a:spcBef>
                 <a:spcPts val="0"/>
               </a:spcBef>
@@ -11067,7 +11135,7 @@
             </a:endParaRPr>
           </a:p>
           <a:p>
-            <a:pPr indent="0" lvl="0" marL="0" rtl="0" algn="l">
+            <a:pPr indent="0" lvl="0" marL="457200" rtl="0" algn="l">
               <a:spcBef>
                 <a:spcPts val="0"/>
               </a:spcBef>
@@ -11099,7 +11167,7 @@
             </a:endParaRPr>
           </a:p>
           <a:p>
-            <a:pPr indent="0" lvl="0" marL="0" rtl="0" algn="l">
+            <a:pPr indent="0" lvl="0" marL="457200" rtl="0" algn="l">
               <a:spcBef>
                 <a:spcPts val="0"/>
               </a:spcBef>
@@ -11123,7 +11191,7 @@
             </a:endParaRPr>
           </a:p>
           <a:p>
-            <a:pPr indent="0" lvl="0" marL="0" rtl="0" algn="l">
+            <a:pPr indent="0" lvl="0" marL="457200" rtl="0" algn="l">
               <a:spcBef>
                 <a:spcPts val="0"/>
               </a:spcBef>
@@ -11155,7 +11223,7 @@
             </a:endParaRPr>
           </a:p>
           <a:p>
-            <a:pPr indent="0" lvl="0" marL="0" rtl="0" algn="l">
+            <a:pPr indent="0" lvl="0" marL="457200" rtl="0" algn="l">
               <a:spcBef>
                 <a:spcPts val="0"/>
               </a:spcBef>
@@ -11211,7 +11279,7 @@
             </a:endParaRPr>
           </a:p>
           <a:p>
-            <a:pPr indent="0" lvl="0" marL="0" rtl="0" algn="l">
+            <a:pPr indent="0" lvl="0" marL="457200" rtl="0" algn="l">
               <a:spcBef>
                 <a:spcPts val="0"/>
               </a:spcBef>
@@ -11235,7 +11303,7 @@
             </a:endParaRPr>
           </a:p>
           <a:p>
-            <a:pPr indent="0" lvl="0" marL="0" rtl="0" algn="l">
+            <a:pPr indent="0" lvl="0" marL="457200" rtl="0" algn="l">
               <a:spcBef>
                 <a:spcPts val="0"/>
               </a:spcBef>
@@ -11254,7 +11322,7 @@
             </a:endParaRPr>
           </a:p>
           <a:p>
-            <a:pPr indent="0" lvl="0" marL="0" rtl="0" algn="l">
+            <a:pPr indent="0" lvl="0" marL="457200" rtl="0" algn="l">
               <a:spcBef>
                 <a:spcPts val="0"/>
               </a:spcBef>
@@ -14291,7 +14359,7 @@
                   <a:srgbClr val="FFFFFF"/>
                 </a:solidFill>
               </a:rPr>
-              <a:t>(inputs, **metaparameters):</a:t>
+              <a:t>(self, inputs, **metaparameters):</a:t>
             </a:r>
             <a:br>
               <a:rPr lang="en" sz="1200">
@@ -14472,7 +14540,7 @@
                   <a:srgbClr val="FFFFFF"/>
                 </a:solidFill>
               </a:rPr>
-              <a:t>i</a:t>
+              <a:t>in</a:t>
             </a:r>
             <a:r>
               <a:rPr lang="en" sz="1200">
@@ -14480,7 +14548,7 @@
                   <a:srgbClr val="FFFFFF"/>
                 </a:solidFill>
               </a:rPr>
-              <a:t>nputs = Conv2D(n_filters, (1, 1), strides=(1, 1), …)(inputs)</a:t>
+              <a:t>puts = Conv2D(n_filters, (1, 1), strides=(1, 1), …)(inputs)</a:t>
             </a:r>
             <a:br>
               <a:rPr lang="en" sz="1200">
@@ -16787,7 +16855,7 @@
                   <a:srgbClr val="FFFFFF"/>
                 </a:solidFill>
               </a:rPr>
-              <a:t>_block(inputs, strides=(2, 2), **metaparameters):</a:t>
+              <a:t>_block(self, inputs, strides=(2, 2), **metaparameters):</a:t>
             </a:r>
             <a:br>
               <a:rPr lang="en" sz="1200">
@@ -22969,7 +23037,7 @@
                   <a:srgbClr val="FFFFFF"/>
                 </a:solidFill>
               </a:rPr>
-              <a:t>stem(inputs):</a:t>
+              <a:t>stem(inputs, **metaparameters):</a:t>
             </a:r>
             <a:endParaRPr>
               <a:solidFill>
@@ -23119,7 +23187,7 @@
                   <a:srgbClr val="FFFFFF"/>
                 </a:solidFill>
               </a:rPr>
-              <a:t> classifier(inputs, n_classes):</a:t>
+              <a:t> classifier(inputs, n_classes, **metaparameters):</a:t>
             </a:r>
             <a:endParaRPr>
               <a:solidFill>
@@ -23229,7 +23297,7 @@
                   <a:srgbClr val="FFFFFF"/>
                 </a:solidFill>
               </a:rPr>
-              <a:t>layers = stem(inputs)</a:t>
+              <a:t>layers = stem(inputs, metaparameters=...)</a:t>
             </a:r>
             <a:endParaRPr>
               <a:solidFill>
@@ -23323,7 +23391,7 @@
                   <a:srgbClr val="FFFFFF"/>
                 </a:solidFill>
               </a:rPr>
-              <a:t>outputs = classifier(layers, n_classes)</a:t>
+              <a:t>outputs = classifier(layers, n_classes, metaparameters=...)</a:t>
             </a:r>
             <a:endParaRPr>
               <a:solidFill>
@@ -23587,70 +23655,6 @@
               <a:spcAft>
                 <a:spcPts val="0"/>
               </a:spcAft>
-              <a:buNone/>
-            </a:pPr>
-            <a:r>
-              <a:rPr b="1" lang="en">
-                <a:solidFill>
-                  <a:srgbClr val="6D9EEB"/>
-                </a:solidFill>
-              </a:rPr>
-              <a:t>class </a:t>
-            </a:r>
-            <a:r>
-              <a:rPr b="1" lang="en">
-                <a:solidFill>
-                  <a:srgbClr val="FFFFFF"/>
-                </a:solidFill>
-              </a:rPr>
-              <a:t>MyModel():</a:t>
-            </a:r>
-            <a:endParaRPr b="1">
-              <a:solidFill>
-                <a:srgbClr val="FFFFFF"/>
-              </a:solidFill>
-            </a:endParaRPr>
-          </a:p>
-          <a:p>
-            <a:pPr indent="0" lvl="0" marL="0" rtl="0" algn="l">
-              <a:spcBef>
-                <a:spcPts val="0"/>
-              </a:spcBef>
-              <a:spcAft>
-                <a:spcPts val="0"/>
-              </a:spcAft>
-              <a:buNone/>
-            </a:pPr>
-            <a:r>
-              <a:rPr b="1" lang="en">
-                <a:solidFill>
-                  <a:srgbClr val="6D9EEB"/>
-                </a:solidFill>
-              </a:rPr>
-              <a:t>      def </a:t>
-            </a:r>
-            <a:r>
-              <a:rPr lang="en">
-                <a:solidFill>
-                  <a:srgbClr val="FFFFFF"/>
-                </a:solidFill>
-              </a:rPr>
-              <a:t>init(self, input_shape, n_classes, **metaparameters):</a:t>
-            </a:r>
-            <a:endParaRPr>
-              <a:solidFill>
-                <a:srgbClr val="FFFFFF"/>
-              </a:solidFill>
-            </a:endParaRPr>
-          </a:p>
-          <a:p>
-            <a:pPr indent="0" lvl="0" marL="0" rtl="0" algn="l">
-              <a:spcBef>
-                <a:spcPts val="0"/>
-              </a:spcBef>
-              <a:spcAft>
-                <a:spcPts val="0"/>
-              </a:spcAft>
               <a:buClr>
                 <a:schemeClr val="dk1"/>
               </a:buClr>
@@ -23659,24 +23663,24 @@
               <a:buNone/>
             </a:pPr>
             <a:r>
-              <a:rPr lang="en">
-                <a:solidFill>
-                  <a:srgbClr val="FFFFFF"/>
+              <a:rPr b="1" lang="en">
+                <a:solidFill>
+                  <a:srgbClr val="6D9EEB"/>
                 </a:solidFill>
               </a:rPr>
-              <a:t>            </a:t>
-            </a:r>
-            <a:r>
-              <a:rPr lang="en">
-                <a:solidFill>
-                  <a:srgbClr val="FFFFFF"/>
+              <a:t>class </a:t>
+            </a:r>
+            <a:r>
+              <a:rPr b="1" lang="en">
+                <a:solidFill>
+                  <a:schemeClr val="lt1"/>
                 </a:solidFill>
               </a:rPr>
-              <a:t>inputs = Input(shape=input_shape)</a:t>
-            </a:r>
-            <a:endParaRPr>
+              <a:t>MyModel():</a:t>
+            </a:r>
+            <a:endParaRPr b="1">
               <a:solidFill>
-                <a:srgbClr val="FFFFFF"/>
+                <a:schemeClr val="lt1"/>
               </a:solidFill>
             </a:endParaRPr>
           </a:p>
@@ -23696,69 +23700,37 @@
               <a:buNone/>
             </a:pPr>
             <a:r>
+              <a:rPr b="1" lang="en">
+                <a:solidFill>
+                  <a:srgbClr val="6D9EEB"/>
+                </a:solidFill>
+              </a:rPr>
+              <a:t>      def </a:t>
+            </a:r>
+            <a:r>
+              <a:rPr b="1" lang="en">
+                <a:solidFill>
+                  <a:srgbClr val="FFFFFF"/>
+                </a:solidFill>
+              </a:rPr>
+              <a:t>__</a:t>
+            </a:r>
+            <a:r>
               <a:rPr lang="en">
                 <a:solidFill>
-                  <a:srgbClr val="FFFFFF"/>
+                  <a:schemeClr val="lt1"/>
                 </a:solidFill>
               </a:rPr>
-              <a:t>            layers = stem(inputs)</a:t>
+              <a:t>init__(self, input_shape, n_classes, **metaparameters):</a:t>
             </a:r>
             <a:endParaRPr>
               <a:solidFill>
-                <a:srgbClr val="FFFFFF"/>
+                <a:schemeClr val="lt1"/>
               </a:solidFill>
             </a:endParaRPr>
           </a:p>
           <a:p>
-            <a:pPr indent="457200" lvl="0" marL="0" rtl="0" algn="l">
-              <a:spcBef>
-                <a:spcPts val="0"/>
-              </a:spcBef>
-              <a:spcAft>
-                <a:spcPts val="0"/>
-              </a:spcAft>
-              <a:buNone/>
-            </a:pPr>
-            <a:r>
-              <a:rPr lang="en">
-                <a:solidFill>
-                  <a:srgbClr val="FFFFFF"/>
-                </a:solidFill>
-              </a:rPr>
-              <a:t>   layers = learner(layers, metaparameters)</a:t>
-            </a:r>
-            <a:endParaRPr>
-              <a:solidFill>
-                <a:srgbClr val="FFFFFF"/>
-              </a:solidFill>
-            </a:endParaRPr>
-          </a:p>
-          <a:p>
-            <a:pPr indent="0" lvl="0" marL="0" rtl="0" algn="l">
-              <a:spcBef>
-                <a:spcPts val="0"/>
-              </a:spcBef>
-              <a:spcAft>
-                <a:spcPts val="0"/>
-              </a:spcAft>
-              <a:buNone/>
-            </a:pPr>
-            <a:r>
-              <a:rPr lang="en">
-                <a:solidFill>
-                  <a:srgbClr val="FFFFFF"/>
-                </a:solidFill>
-              </a:rPr>
-              <a:t>            outputs = classifier(layers, n_classes)</a:t>
-            </a:r>
-            <a:endParaRPr>
-              <a:solidFill>
-                <a:srgbClr val="FFFFFF"/>
-              </a:solidFill>
-            </a:endParaRPr>
-          </a:p>
-          <a:p>
-            <a:pPr indent="457200" lvl="0" marL="0" rtl="0" algn="l">
+            <a:pPr indent="0" lvl="0" marL="0" rtl="0" algn="l">
               <a:spcBef>
                 <a:spcPts val="0"/>
               </a:spcBef>
@@ -23775,7 +23747,123 @@
             <a:r>
               <a:rPr lang="en">
                 <a:solidFill>
-                  <a:srgbClr val="FFFFFF"/>
+                  <a:schemeClr val="lt1"/>
+                </a:solidFill>
+              </a:rPr>
+              <a:t>            inputs = Input(shape=input_shape)</a:t>
+            </a:r>
+            <a:endParaRPr>
+              <a:solidFill>
+                <a:schemeClr val="lt1"/>
+              </a:solidFill>
+            </a:endParaRPr>
+          </a:p>
+          <a:p>
+            <a:pPr indent="0" lvl="0" marL="0" rtl="0" algn="l">
+              <a:spcBef>
+                <a:spcPts val="0"/>
+              </a:spcBef>
+              <a:spcAft>
+                <a:spcPts val="0"/>
+              </a:spcAft>
+              <a:buClr>
+                <a:schemeClr val="dk1"/>
+              </a:buClr>
+              <a:buSzPts val="1100"/>
+              <a:buFont typeface="Arial"/>
+              <a:buNone/>
+            </a:pPr>
+            <a:r>
+              <a:rPr lang="en">
+                <a:solidFill>
+                  <a:schemeClr val="lt1"/>
+                </a:solidFill>
+              </a:rPr>
+              <a:t>            layers = stem(inputs, **metaparameters)</a:t>
+            </a:r>
+            <a:endParaRPr>
+              <a:solidFill>
+                <a:schemeClr val="lt1"/>
+              </a:solidFill>
+            </a:endParaRPr>
+          </a:p>
+          <a:p>
+            <a:pPr indent="457200" lvl="0" marL="0" rtl="0" algn="l">
+              <a:spcBef>
+                <a:spcPts val="0"/>
+              </a:spcBef>
+              <a:spcAft>
+                <a:spcPts val="0"/>
+              </a:spcAft>
+              <a:buClr>
+                <a:schemeClr val="dk1"/>
+              </a:buClr>
+              <a:buSzPts val="1100"/>
+              <a:buFont typeface="Arial"/>
+              <a:buNone/>
+            </a:pPr>
+            <a:r>
+              <a:rPr lang="en">
+                <a:solidFill>
+                  <a:schemeClr val="lt1"/>
+                </a:solidFill>
+              </a:rPr>
+              <a:t>   layers = learner(layers, **metaparameters)</a:t>
+            </a:r>
+            <a:endParaRPr>
+              <a:solidFill>
+                <a:schemeClr val="lt1"/>
+              </a:solidFill>
+            </a:endParaRPr>
+          </a:p>
+          <a:p>
+            <a:pPr indent="0" lvl="0" marL="0" rtl="0" algn="l">
+              <a:spcBef>
+                <a:spcPts val="0"/>
+              </a:spcBef>
+              <a:spcAft>
+                <a:spcPts val="0"/>
+              </a:spcAft>
+              <a:buClr>
+                <a:schemeClr val="dk1"/>
+              </a:buClr>
+              <a:buSzPts val="1100"/>
+              <a:buFont typeface="Arial"/>
+              <a:buNone/>
+            </a:pPr>
+            <a:r>
+              <a:rPr lang="en">
+                <a:solidFill>
+                  <a:schemeClr val="lt1"/>
+                </a:solidFill>
+              </a:rPr>
+              <a:t>            outputs = classifier(layers, n_classes, **metaparameters)</a:t>
+            </a:r>
+            <a:endParaRPr>
+              <a:solidFill>
+                <a:schemeClr val="lt1"/>
+              </a:solidFill>
+            </a:endParaRPr>
+          </a:p>
+          <a:p>
+            <a:pPr indent="457200" lvl="0" marL="0" rtl="0" algn="l">
+              <a:spcBef>
+                <a:spcPts val="0"/>
+              </a:spcBef>
+              <a:spcAft>
+                <a:spcPts val="0"/>
+              </a:spcAft>
+              <a:buClr>
+                <a:schemeClr val="dk1"/>
+              </a:buClr>
+              <a:buSzPts val="1100"/>
+              <a:buFont typeface="Arial"/>
+              <a:buNone/>
+            </a:pPr>
+            <a:r>
+              <a:rPr lang="en">
+                <a:solidFill>
+                  <a:schemeClr val="lt1"/>
                 </a:solidFill>
               </a:rPr>
               <a:t>   model = Model(inputs, outputs)</a:t>
@@ -23783,13 +23871,13 @@
             <a:br>
               <a:rPr lang="en">
                 <a:solidFill>
-                  <a:srgbClr val="FFFFFF"/>
+                  <a:schemeClr val="lt1"/>
                 </a:solidFill>
               </a:rPr>
             </a:br>
             <a:endParaRPr b="1">
               <a:solidFill>
-                <a:srgbClr val="FFFFFF"/>
+                <a:schemeClr val="lt1"/>
               </a:solidFill>
             </a:endParaRPr>
           </a:p>
@@ -23801,6 +23889,11 @@
               <a:spcAft>
                 <a:spcPts val="0"/>
               </a:spcAft>
+              <a:buClr>
+                <a:schemeClr val="dk1"/>
+              </a:buClr>
+              <a:buSzPts val="1100"/>
+              <a:buFont typeface="Arial"/>
               <a:buNone/>
             </a:pPr>
             <a:r>
@@ -23809,15 +23902,7 @@
                   <a:srgbClr val="6D9EEB"/>
                 </a:solidFill>
               </a:rPr>
-              <a:t>      </a:t>
-            </a:r>
-            <a:r>
-              <a:rPr b="1" lang="en">
-                <a:solidFill>
-                  <a:srgbClr val="6D9EEB"/>
-                </a:solidFill>
-              </a:rPr>
-              <a:t>def</a:t>
+              <a:t>      def</a:t>
             </a:r>
             <a:r>
               <a:rPr b="1" lang="en">
@@ -23830,14 +23915,14 @@
             <a:r>
               <a:rPr lang="en">
                 <a:solidFill>
-                  <a:srgbClr val="FFFFFF"/>
+                  <a:schemeClr val="lt1"/>
                 </a:solidFill>
               </a:rPr>
-              <a:t>stem(self, inputs):</a:t>
+              <a:t>stem(self, inputs, **metaparameters):</a:t>
             </a:r>
             <a:endParaRPr>
               <a:solidFill>
-                <a:srgbClr val="FFFFFF"/>
+                <a:schemeClr val="lt1"/>
               </a:solidFill>
             </a:endParaRPr>
           </a:p>
@@ -23849,19 +23934,24 @@
               <a:spcAft>
                 <a:spcPts val="0"/>
               </a:spcAft>
+              <a:buClr>
+                <a:schemeClr val="dk1"/>
+              </a:buClr>
+              <a:buSzPts val="1100"/>
+              <a:buFont typeface="Arial"/>
               <a:buNone/>
             </a:pPr>
             <a:r>
               <a:rPr lang="en">
                 <a:solidFill>
-                  <a:srgbClr val="FFFFFF"/>
+                  <a:schemeClr val="lt1"/>
                 </a:solidFill>
               </a:rPr>
               <a:t>             ...</a:t>
             </a:r>
             <a:endParaRPr>
               <a:solidFill>
-                <a:srgbClr val="FFFFFF"/>
+                <a:schemeClr val="lt1"/>
               </a:solidFill>
             </a:endParaRPr>
           </a:p>
@@ -23873,6 +23963,11 @@
               <a:spcAft>
                 <a:spcPts val="0"/>
               </a:spcAft>
+              <a:buClr>
+                <a:schemeClr val="dk1"/>
+              </a:buClr>
+              <a:buSzPts val="1100"/>
+              <a:buFont typeface="Arial"/>
               <a:buNone/>
             </a:pPr>
             <a:r>
@@ -23880,7 +23975,7 @@
             </a:r>
             <a:endParaRPr>
               <a:solidFill>
-                <a:srgbClr val="FFFFFF"/>
+                <a:schemeClr val="lt1"/>
               </a:solidFill>
             </a:endParaRPr>
           </a:p>
@@ -23892,6 +23987,11 @@
               <a:spcAft>
                 <a:spcPts val="0"/>
               </a:spcAft>
+              <a:buClr>
+                <a:schemeClr val="dk1"/>
+              </a:buClr>
+              <a:buSzPts val="1100"/>
+              <a:buFont typeface="Arial"/>
               <a:buNone/>
             </a:pPr>
             <a:r>
@@ -23900,27 +24000,19 @@
                   <a:srgbClr val="6D9EEB"/>
                 </a:solidFill>
               </a:rPr>
-              <a:t>       </a:t>
-            </a:r>
-            <a:r>
-              <a:rPr b="1" lang="en">
-                <a:solidFill>
-                  <a:srgbClr val="6D9EEB"/>
-                </a:solidFill>
-              </a:rPr>
-              <a:t>def </a:t>
+              <a:t>       def </a:t>
             </a:r>
             <a:r>
               <a:rPr lang="en">
                 <a:solidFill>
-                  <a:srgbClr val="FFFFFF"/>
+                  <a:schemeClr val="lt1"/>
                 </a:solidFill>
               </a:rPr>
               <a:t>learner(self, inputs, **metaparameters):</a:t>
             </a:r>
             <a:endParaRPr>
               <a:solidFill>
-                <a:srgbClr val="FFFFFF"/>
+                <a:schemeClr val="lt1"/>
               </a:solidFill>
             </a:endParaRPr>
           </a:p>
@@ -23932,19 +24024,24 @@
               <a:spcAft>
                 <a:spcPts val="0"/>
               </a:spcAft>
+              <a:buClr>
+                <a:schemeClr val="dk1"/>
+              </a:buClr>
+              <a:buSzPts val="1100"/>
+              <a:buFont typeface="Arial"/>
               <a:buNone/>
             </a:pPr>
             <a:r>
               <a:rPr lang="en">
                 <a:solidFill>
-                  <a:srgbClr val="FFFFFF"/>
+                  <a:schemeClr val="lt1"/>
                 </a:solidFill>
               </a:rPr>
               <a:t>             ...</a:t>
             </a:r>
             <a:endParaRPr>
               <a:solidFill>
-                <a:srgbClr val="FFFFFF"/>
+                <a:schemeClr val="lt1"/>
               </a:solidFill>
             </a:endParaRPr>
           </a:p>
@@ -23956,6 +24053,11 @@
               <a:spcAft>
                 <a:spcPts val="0"/>
               </a:spcAft>
+              <a:buClr>
+                <a:schemeClr val="dk1"/>
+              </a:buClr>
+              <a:buSzPts val="1100"/>
+              <a:buFont typeface="Arial"/>
               <a:buNone/>
             </a:pPr>
             <a:r>
@@ -23963,7 +24065,7 @@
             </a:r>
             <a:endParaRPr>
               <a:solidFill>
-                <a:srgbClr val="FFFFFF"/>
+                <a:schemeClr val="lt1"/>
               </a:solidFill>
             </a:endParaRPr>
           </a:p>
@@ -23975,6 +24077,11 @@
               <a:spcAft>
                 <a:spcPts val="0"/>
               </a:spcAft>
+              <a:buClr>
+                <a:schemeClr val="dk1"/>
+              </a:buClr>
+              <a:buSzPts val="1100"/>
+              <a:buFont typeface="Arial"/>
               <a:buNone/>
             </a:pPr>
             <a:r>
@@ -23983,27 +24090,19 @@
                   <a:srgbClr val="6D9EEB"/>
                 </a:solidFill>
               </a:rPr>
-              <a:t>       </a:t>
-            </a:r>
-            <a:r>
-              <a:rPr b="1" lang="en">
-                <a:solidFill>
-                  <a:srgbClr val="6D9EEB"/>
+              <a:t>       def</a:t>
+            </a:r>
+            <a:r>
+              <a:rPr lang="en">
+                <a:solidFill>
+                  <a:schemeClr val="lt1"/>
                 </a:solidFill>
               </a:rPr>
-              <a:t>def</a:t>
-            </a:r>
-            <a:r>
-              <a:rPr lang="en">
-                <a:solidFill>
-                  <a:srgbClr val="FFFFFF"/>
-                </a:solidFill>
-              </a:rPr>
-              <a:t> classifier(self, inputs, n_classes):</a:t>
+              <a:t> classifier(self, inputs, n_classes, **metaparameters):</a:t>
             </a:r>
             <a:endParaRPr>
               <a:solidFill>
-                <a:srgbClr val="FFFFFF"/>
+                <a:schemeClr val="lt1"/>
               </a:solidFill>
             </a:endParaRPr>
           </a:p>
@@ -24015,19 +24114,43 @@
               <a:spcAft>
                 <a:spcPts val="0"/>
               </a:spcAft>
+              <a:buClr>
+                <a:schemeClr val="dk1"/>
+              </a:buClr>
+              <a:buSzPts val="1100"/>
+              <a:buFont typeface="Arial"/>
               <a:buNone/>
             </a:pPr>
             <a:r>
               <a:rPr lang="en">
                 <a:solidFill>
-                  <a:srgbClr val="FFFFFF"/>
+                  <a:schemeClr val="lt1"/>
                 </a:solidFill>
               </a:rPr>
               <a:t>              ...</a:t>
             </a:r>
             <a:endParaRPr>
               <a:solidFill>
-                <a:srgbClr val="FFFFFF"/>
+                <a:schemeClr val="lt1"/>
+              </a:solidFill>
+            </a:endParaRPr>
+          </a:p>
+          <a:p>
+            <a:pPr indent="0" lvl="0" marL="0" rtl="0" algn="l">
+              <a:spcBef>
+                <a:spcPts val="0"/>
+              </a:spcBef>
+              <a:spcAft>
+                <a:spcPts val="0"/>
+              </a:spcAft>
+              <a:buNone/>
+            </a:pPr>
+            <a:r>
+              <a:t/>
+            </a:r>
+            <a:endParaRPr b="1">
+              <a:solidFill>
+                <a:srgbClr val="6D9EEB"/>
               </a:solidFill>
             </a:endParaRPr>
           </a:p>
@@ -25210,12 +25333,20 @@
               <a:buNone/>
             </a:pPr>
             <a:r>
+              <a:rPr b="1" lang="en" sz="1200">
+                <a:solidFill>
+                  <a:srgbClr val="6D9EEB"/>
+                </a:solidFill>
+              </a:rPr>
+              <a:t>    def </a:t>
+            </a:r>
+            <a:r>
               <a:rPr lang="en" sz="1200">
                 <a:solidFill>
                   <a:srgbClr val="FFFFFF"/>
                 </a:solidFill>
               </a:rPr>
-              <a:t>    @staticmethod</a:t>
+              <a:t>group(inputs, **metaparameters):</a:t>
             </a:r>
             <a:endParaRPr sz="1200">
               <a:solidFill>
@@ -25234,20 +25365,7 @@
               <a:buNone/>
             </a:pPr>
             <a:r>
-              <a:rPr b="1" lang="en" sz="1200">
-                <a:solidFill>
-                  <a:srgbClr val="6D9EEB"/>
-                </a:solidFill>
-              </a:rPr>
-              <a:t>    def </a:t>
-            </a:r>
-            <a:r>
-              <a:rPr lang="en" sz="1200">
-                <a:solidFill>
-                  <a:srgbClr val="FFFFFF"/>
-                </a:solidFill>
-              </a:rPr>
-              <a:t>group(inputs, **metaparameters):</a:t>
+              <a:t/>
             </a:r>
             <a:endParaRPr sz="1200">
               <a:solidFill>
@@ -25266,7 +25384,36 @@
               <a:buNone/>
             </a:pPr>
             <a:r>
-              <a:t/>
+              <a:rPr b="1" lang="en" sz="1200">
+                <a:solidFill>
+                  <a:srgbClr val="6D9EEB"/>
+                </a:solidFill>
+              </a:rPr>
+              <a:t>         for</a:t>
+            </a:r>
+            <a:r>
+              <a:rPr lang="en" sz="1200">
+                <a:solidFill>
+                  <a:srgbClr val="FFFFFF"/>
+                </a:solidFill>
+              </a:rPr>
+              <a:t> block_params </a:t>
+            </a:r>
+            <a:r>
+              <a:rPr b="1" lang="en" sz="1200">
+                <a:solidFill>
+                  <a:srgbClr val="6FA8DC"/>
+                </a:solidFill>
+              </a:rPr>
+              <a:t>in</a:t>
+            </a:r>
+            <a:r>
+              <a:rPr lang="en" sz="1200">
+                <a:solidFill>
+                  <a:srgbClr val="FFFFFF"/>
+                </a:solidFill>
+              </a:rPr>
+              <a:t> metaparameters[‘n_blocks’]:</a:t>
             </a:r>
             <a:endParaRPr sz="1200">
               <a:solidFill>
@@ -25285,36 +25432,12 @@
               <a:buNone/>
             </a:pPr>
             <a:r>
-              <a:rPr b="1" lang="en" sz="1200">
-                <a:solidFill>
-                  <a:srgbClr val="6D9EEB"/>
+              <a:rPr lang="en" sz="1200">
+                <a:solidFill>
+                  <a:srgbClr val="FFFFFF"/>
                 </a:solidFill>
               </a:rPr>
-              <a:t>         for</a:t>
-            </a:r>
-            <a:r>
-              <a:rPr lang="en" sz="1200">
-                <a:solidFill>
-                  <a:srgbClr val="FFFFFF"/>
-                </a:solidFill>
-              </a:rPr>
-              <a:t> block_params </a:t>
-            </a:r>
-            <a:r>
-              <a:rPr b="1" lang="en" sz="1200">
-                <a:solidFill>
-                  <a:srgbClr val="6FA8DC"/>
-                </a:solidFill>
-              </a:rPr>
-              <a:t>in</a:t>
-            </a:r>
-            <a:r>
-              <a:rPr lang="en" sz="1200">
-                <a:solidFill>
-                  <a:srgbClr val="FFFFFF"/>
-                </a:solidFill>
-              </a:rPr>
-              <a:t> metaparameters[‘n_blocks’]:</a:t>
+              <a:t>	    inputs = block(inputs, block_parameters)</a:t>
             </a:r>
             <a:endParaRPr sz="1200">
               <a:solidFill>
@@ -25332,13 +25455,28 @@
               </a:spcAft>
               <a:buNone/>
             </a:pPr>
+            <a:br>
+              <a:rPr b="1" lang="en" sz="1200">
+                <a:solidFill>
+                  <a:srgbClr val="6D9EEB"/>
+                </a:solidFill>
+              </a:rPr>
+            </a:br>
+            <a:r>
+              <a:rPr b="1" lang="en" sz="1200">
+                <a:solidFill>
+                  <a:srgbClr val="6D9EEB"/>
+                </a:solidFill>
+              </a:rPr>
+              <a:t>     def </a:t>
+            </a:r>
             <a:r>
               <a:rPr lang="en" sz="1200">
                 <a:solidFill>
                   <a:srgbClr val="FFFFFF"/>
                 </a:solidFill>
               </a:rPr>
-              <a:t>	    inputs = block(inputs, block_parameters)</a:t>
+              <a:t>block(inputs, **metaparameters):</a:t>
             </a:r>
             <a:endParaRPr sz="1200">
               <a:solidFill>
@@ -25357,7 +25495,12 @@
               <a:buNone/>
             </a:pPr>
             <a:r>
-              <a:t/>
+              <a:rPr lang="en" sz="1200">
+                <a:solidFill>
+                  <a:srgbClr val="FFFFFF"/>
+                </a:solidFill>
+              </a:rPr>
+              <a:t>          ...</a:t>
             </a:r>
             <a:endParaRPr sz="1200">
               <a:solidFill>
@@ -25376,85 +25519,6 @@
               <a:buNone/>
             </a:pPr>
             <a:r>
-              <a:rPr b="1" lang="en" sz="1200">
-                <a:solidFill>
-                  <a:srgbClr val="6D9EEB"/>
-                </a:solidFill>
-              </a:rPr>
-              <a:t>    </a:t>
-            </a:r>
-            <a:r>
-              <a:rPr lang="en" sz="1200">
-                <a:solidFill>
-                  <a:schemeClr val="lt1"/>
-                </a:solidFill>
-              </a:rPr>
-              <a:t>@staticmethod</a:t>
-            </a:r>
-            <a:br>
-              <a:rPr b="1" lang="en" sz="1200">
-                <a:solidFill>
-                  <a:srgbClr val="6D9EEB"/>
-                </a:solidFill>
-              </a:rPr>
-            </a:br>
-            <a:r>
-              <a:rPr b="1" lang="en" sz="1200">
-                <a:solidFill>
-                  <a:srgbClr val="6D9EEB"/>
-                </a:solidFill>
-              </a:rPr>
-              <a:t>     def </a:t>
-            </a:r>
-            <a:r>
-              <a:rPr lang="en" sz="1200">
-                <a:solidFill>
-                  <a:srgbClr val="FFFFFF"/>
-                </a:solidFill>
-              </a:rPr>
-              <a:t>block(inputs, **metaparameters):</a:t>
-            </a:r>
-            <a:endParaRPr sz="1200">
-              <a:solidFill>
-                <a:srgbClr val="FFFFFF"/>
-              </a:solidFill>
-            </a:endParaRPr>
-          </a:p>
-          <a:p>
-            <a:pPr indent="0" lvl="0" marL="0" rtl="0" algn="l">
-              <a:spcBef>
-                <a:spcPts val="0"/>
-              </a:spcBef>
-              <a:spcAft>
-                <a:spcPts val="0"/>
-              </a:spcAft>
-              <a:buNone/>
-            </a:pPr>
-            <a:r>
-              <a:rPr lang="en" sz="1200">
-                <a:solidFill>
-                  <a:srgbClr val="FFFFFF"/>
-                </a:solidFill>
-              </a:rPr>
-              <a:t>          ...</a:t>
-            </a:r>
-            <a:endParaRPr sz="1200">
-              <a:solidFill>
-                <a:srgbClr val="FFFFFF"/>
-              </a:solidFill>
-            </a:endParaRPr>
-          </a:p>
-          <a:p>
-            <a:pPr indent="0" lvl="0" marL="0" rtl="0" algn="l">
-              <a:spcBef>
-                <a:spcPts val="0"/>
-              </a:spcBef>
-              <a:spcAft>
-                <a:spcPts val="0"/>
-              </a:spcAft>
-              <a:buNone/>
-            </a:pPr>
-            <a:r>
               <a:t/>
             </a:r>
             <a:endParaRPr>
@@ -25559,6 +25623,22 @@
               <a:buNone/>
             </a:pPr>
             <a:r>
+              <a:rPr lang="en"/>
+              <a:t>The metaparameters provide configuring the group and block level macro-architecture.</a:t>
+            </a:r>
+            <a:endParaRPr/>
+          </a:p>
+          <a:p>
+            <a:pPr indent="0" lvl="0" marL="0" rtl="0" algn="l">
+              <a:spcBef>
+                <a:spcPts val="0"/>
+              </a:spcBef>
+              <a:spcAft>
+                <a:spcPts val="0"/>
+              </a:spcAft>
+              <a:buNone/>
+            </a:pPr>
+            <a:r>
               <a:t/>
             </a:r>
             <a:endParaRPr/>
@@ -25619,8 +25699,22 @@
               <a:buNone/>
             </a:pPr>
             <a:r>
-              <a:rPr lang="en"/>
-              <a:t>@staticmethod provides means to tear off buildable micro components that are configured by metaparameters (factory design pattern).</a:t>
+              <a:t/>
+            </a:r>
+            <a:endParaRPr/>
+          </a:p>
+          <a:p>
+            <a:pPr indent="0" lvl="0" marL="0" rtl="0" algn="l">
+              <a:spcBef>
+                <a:spcPts val="0"/>
+              </a:spcBef>
+              <a:spcAft>
+                <a:spcPts val="0"/>
+              </a:spcAft>
+              <a:buNone/>
+            </a:pPr>
+            <a:r>
+              <a:t/>
             </a:r>
             <a:endParaRPr/>
           </a:p>

</xml_diff>